<commit_message>
skip failed fortessa combining for wsp
</commit_message>
<xml_diff>
--- a/explore/roadMap.pptx
+++ b/explore/roadMap.pptx
@@ -4,9 +4,13 @@
   <p:sldMasterIdLst>
     <p:sldMasterId id="2147483648" r:id="rId1"/>
   </p:sldMasterIdLst>
+  <p:notesMasterIdLst>
+    <p:notesMasterId r:id="rId5"/>
+  </p:notesMasterIdLst>
   <p:sldIdLst>
     <p:sldId id="257" r:id="rId2"/>
     <p:sldId id="258" r:id="rId3"/>
+    <p:sldId id="259" r:id="rId4"/>
   </p:sldIdLst>
   <p:sldSz cx="9144000" cy="6858000" type="letter"/>
   <p:notesSz cx="7010400" cy="9296400"/>
@@ -124,6 +128,356 @@
 </p:presentation>
 </file>
 
+<file path=ppt/notesMasters/notesMaster1.xml><?xml version="1.0" encoding="utf-8"?>
+<p:notesMaster xmlns:a="http://schemas.openxmlformats.org/drawingml/2006/main" xmlns:r="http://schemas.openxmlformats.org/officeDocument/2006/relationships" xmlns:p="http://schemas.openxmlformats.org/presentationml/2006/main">
+  <p:cSld>
+    <p:bg>
+      <p:bgRef idx="1001">
+        <a:schemeClr val="bg1"/>
+      </p:bgRef>
+    </p:bg>
+    <p:spTree>
+      <p:nvGrpSpPr>
+        <p:cNvPr id="1" name=""/>
+        <p:cNvGrpSpPr/>
+        <p:nvPr/>
+      </p:nvGrpSpPr>
+      <p:grpSpPr>
+        <a:xfrm>
+          <a:off x="0" y="0"/>
+          <a:ext cx="0" cy="0"/>
+          <a:chOff x="0" y="0"/>
+          <a:chExt cx="0" cy="0"/>
+        </a:xfrm>
+      </p:grpSpPr>
+      <p:sp>
+        <p:nvSpPr>
+          <p:cNvPr id="2" name="Header Placeholder 1"/>
+          <p:cNvSpPr>
+            <a:spLocks noGrp="1"/>
+          </p:cNvSpPr>
+          <p:nvPr>
+            <p:ph type="hdr" sz="quarter"/>
+          </p:nvPr>
+        </p:nvSpPr>
+        <p:spPr>
+          <a:xfrm>
+            <a:off x="0" y="0"/>
+            <a:ext cx="3038475" cy="466725"/>
+          </a:xfrm>
+          <a:prstGeom prst="rect">
+            <a:avLst/>
+          </a:prstGeom>
+        </p:spPr>
+        <p:txBody>
+          <a:bodyPr vert="horz" lIns="91440" tIns="45720" rIns="91440" bIns="45720" rtlCol="0"/>
+          <a:lstStyle>
+            <a:lvl1pPr algn="l">
+              <a:defRPr sz="1200"/>
+            </a:lvl1pPr>
+          </a:lstStyle>
+          <a:p>
+            <a:endParaRPr lang="en-US"/>
+          </a:p>
+        </p:txBody>
+      </p:sp>
+      <p:sp>
+        <p:nvSpPr>
+          <p:cNvPr id="3" name="Date Placeholder 2"/>
+          <p:cNvSpPr>
+            <a:spLocks noGrp="1"/>
+          </p:cNvSpPr>
+          <p:nvPr>
+            <p:ph type="dt" idx="1"/>
+          </p:nvPr>
+        </p:nvSpPr>
+        <p:spPr>
+          <a:xfrm>
+            <a:off x="3970338" y="0"/>
+            <a:ext cx="3038475" cy="466725"/>
+          </a:xfrm>
+          <a:prstGeom prst="rect">
+            <a:avLst/>
+          </a:prstGeom>
+        </p:spPr>
+        <p:txBody>
+          <a:bodyPr vert="horz" lIns="91440" tIns="45720" rIns="91440" bIns="45720" rtlCol="0"/>
+          <a:lstStyle>
+            <a:lvl1pPr algn="r">
+              <a:defRPr sz="1200"/>
+            </a:lvl1pPr>
+          </a:lstStyle>
+          <a:p>
+            <a:fld id="{44D4D2B4-8595-7149-99A3-0A88C8202C9E}" type="datetimeFigureOut">
+              <a:rPr lang="en-US" smtClean="0"/>
+              <a:t>6/30/17</a:t>
+            </a:fld>
+            <a:endParaRPr lang="en-US"/>
+          </a:p>
+        </p:txBody>
+      </p:sp>
+      <p:sp>
+        <p:nvSpPr>
+          <p:cNvPr id="4" name="Slide Image Placeholder 3"/>
+          <p:cNvSpPr>
+            <a:spLocks noGrp="1" noRot="1" noChangeAspect="1"/>
+          </p:cNvSpPr>
+          <p:nvPr>
+            <p:ph type="sldImg" idx="2"/>
+          </p:nvPr>
+        </p:nvSpPr>
+        <p:spPr>
+          <a:xfrm>
+            <a:off x="1414463" y="1162050"/>
+            <a:ext cx="4181475" cy="3136900"/>
+          </a:xfrm>
+          <a:prstGeom prst="rect">
+            <a:avLst/>
+          </a:prstGeom>
+          <a:noFill/>
+          <a:ln w="12700">
+            <a:solidFill>
+              <a:prstClr val="black"/>
+            </a:solidFill>
+          </a:ln>
+        </p:spPr>
+        <p:txBody>
+          <a:bodyPr vert="horz" lIns="91440" tIns="45720" rIns="91440" bIns="45720" rtlCol="0" anchor="ctr"/>
+          <a:lstStyle/>
+          <a:p>
+            <a:endParaRPr lang="en-US"/>
+          </a:p>
+        </p:txBody>
+      </p:sp>
+      <p:sp>
+        <p:nvSpPr>
+          <p:cNvPr id="5" name="Notes Placeholder 4"/>
+          <p:cNvSpPr>
+            <a:spLocks noGrp="1"/>
+          </p:cNvSpPr>
+          <p:nvPr>
+            <p:ph type="body" sz="quarter" idx="3"/>
+          </p:nvPr>
+        </p:nvSpPr>
+        <p:spPr>
+          <a:xfrm>
+            <a:off x="701675" y="4473575"/>
+            <a:ext cx="5607050" cy="3660775"/>
+          </a:xfrm>
+          <a:prstGeom prst="rect">
+            <a:avLst/>
+          </a:prstGeom>
+        </p:spPr>
+        <p:txBody>
+          <a:bodyPr vert="horz" lIns="91440" tIns="45720" rIns="91440" bIns="45720" rtlCol="0"/>
+          <a:lstStyle/>
+          <a:p>
+            <a:pPr lvl="0"/>
+            <a:r>
+              <a:rPr lang="en-US" smtClean="0"/>
+              <a:t>Click to edit Master text styles</a:t>
+            </a:r>
+          </a:p>
+          <a:p>
+            <a:pPr lvl="1"/>
+            <a:r>
+              <a:rPr lang="en-US" smtClean="0"/>
+              <a:t>Second level</a:t>
+            </a:r>
+          </a:p>
+          <a:p>
+            <a:pPr lvl="2"/>
+            <a:r>
+              <a:rPr lang="en-US" smtClean="0"/>
+              <a:t>Third level</a:t>
+            </a:r>
+          </a:p>
+          <a:p>
+            <a:pPr lvl="3"/>
+            <a:r>
+              <a:rPr lang="en-US" smtClean="0"/>
+              <a:t>Fourth level</a:t>
+            </a:r>
+          </a:p>
+          <a:p>
+            <a:pPr lvl="4"/>
+            <a:r>
+              <a:rPr lang="en-US" smtClean="0"/>
+              <a:t>Fifth level</a:t>
+            </a:r>
+            <a:endParaRPr lang="en-US"/>
+          </a:p>
+        </p:txBody>
+      </p:sp>
+      <p:sp>
+        <p:nvSpPr>
+          <p:cNvPr id="6" name="Footer Placeholder 5"/>
+          <p:cNvSpPr>
+            <a:spLocks noGrp="1"/>
+          </p:cNvSpPr>
+          <p:nvPr>
+            <p:ph type="ftr" sz="quarter" idx="4"/>
+          </p:nvPr>
+        </p:nvSpPr>
+        <p:spPr>
+          <a:xfrm>
+            <a:off x="0" y="8829675"/>
+            <a:ext cx="3038475" cy="466725"/>
+          </a:xfrm>
+          <a:prstGeom prst="rect">
+            <a:avLst/>
+          </a:prstGeom>
+        </p:spPr>
+        <p:txBody>
+          <a:bodyPr vert="horz" lIns="91440" tIns="45720" rIns="91440" bIns="45720" rtlCol="0" anchor="b"/>
+          <a:lstStyle>
+            <a:lvl1pPr algn="l">
+              <a:defRPr sz="1200"/>
+            </a:lvl1pPr>
+          </a:lstStyle>
+          <a:p>
+            <a:endParaRPr lang="en-US"/>
+          </a:p>
+        </p:txBody>
+      </p:sp>
+      <p:sp>
+        <p:nvSpPr>
+          <p:cNvPr id="7" name="Slide Number Placeholder 6"/>
+          <p:cNvSpPr>
+            <a:spLocks noGrp="1"/>
+          </p:cNvSpPr>
+          <p:nvPr>
+            <p:ph type="sldNum" sz="quarter" idx="5"/>
+          </p:nvPr>
+        </p:nvSpPr>
+        <p:spPr>
+          <a:xfrm>
+            <a:off x="3970338" y="8829675"/>
+            <a:ext cx="3038475" cy="466725"/>
+          </a:xfrm>
+          <a:prstGeom prst="rect">
+            <a:avLst/>
+          </a:prstGeom>
+        </p:spPr>
+        <p:txBody>
+          <a:bodyPr vert="horz" lIns="91440" tIns="45720" rIns="91440" bIns="45720" rtlCol="0" anchor="b"/>
+          <a:lstStyle>
+            <a:lvl1pPr algn="r">
+              <a:defRPr sz="1200"/>
+            </a:lvl1pPr>
+          </a:lstStyle>
+          <a:p>
+            <a:fld id="{62D6A241-AB7C-B745-8465-B59968179DA6}" type="slidenum">
+              <a:rPr lang="en-US" smtClean="0"/>
+              <a:t>‹#›</a:t>
+            </a:fld>
+            <a:endParaRPr lang="en-US"/>
+          </a:p>
+        </p:txBody>
+      </p:sp>
+    </p:spTree>
+    <p:extLst>
+      <p:ext uri="{BB962C8B-B14F-4D97-AF65-F5344CB8AC3E}">
+        <p14:creationId xmlns:p14="http://schemas.microsoft.com/office/powerpoint/2010/main" val="1994553469"/>
+      </p:ext>
+    </p:extLst>
+  </p:cSld>
+  <p:clrMap bg1="lt1" tx1="dk1" bg2="lt2" tx2="dk2" accent1="accent1" accent2="accent2" accent3="accent3" accent4="accent4" accent5="accent5" accent6="accent6" hlink="hlink" folHlink="folHlink"/>
+  <p:notesStyle>
+    <a:lvl1pPr marL="0" algn="l" defTabSz="914400" rtl="0" eaLnBrk="1" latinLnBrk="0" hangingPunct="1">
+      <a:defRPr sz="1200" kern="1200">
+        <a:solidFill>
+          <a:schemeClr val="tx1"/>
+        </a:solidFill>
+        <a:latin typeface="+mn-lt"/>
+        <a:ea typeface="+mn-ea"/>
+        <a:cs typeface="+mn-cs"/>
+      </a:defRPr>
+    </a:lvl1pPr>
+    <a:lvl2pPr marL="457200" algn="l" defTabSz="914400" rtl="0" eaLnBrk="1" latinLnBrk="0" hangingPunct="1">
+      <a:defRPr sz="1200" kern="1200">
+        <a:solidFill>
+          <a:schemeClr val="tx1"/>
+        </a:solidFill>
+        <a:latin typeface="+mn-lt"/>
+        <a:ea typeface="+mn-ea"/>
+        <a:cs typeface="+mn-cs"/>
+      </a:defRPr>
+    </a:lvl2pPr>
+    <a:lvl3pPr marL="914400" algn="l" defTabSz="914400" rtl="0" eaLnBrk="1" latinLnBrk="0" hangingPunct="1">
+      <a:defRPr sz="1200" kern="1200">
+        <a:solidFill>
+          <a:schemeClr val="tx1"/>
+        </a:solidFill>
+        <a:latin typeface="+mn-lt"/>
+        <a:ea typeface="+mn-ea"/>
+        <a:cs typeface="+mn-cs"/>
+      </a:defRPr>
+    </a:lvl3pPr>
+    <a:lvl4pPr marL="1371600" algn="l" defTabSz="914400" rtl="0" eaLnBrk="1" latinLnBrk="0" hangingPunct="1">
+      <a:defRPr sz="1200" kern="1200">
+        <a:solidFill>
+          <a:schemeClr val="tx1"/>
+        </a:solidFill>
+        <a:latin typeface="+mn-lt"/>
+        <a:ea typeface="+mn-ea"/>
+        <a:cs typeface="+mn-cs"/>
+      </a:defRPr>
+    </a:lvl4pPr>
+    <a:lvl5pPr marL="1828800" algn="l" defTabSz="914400" rtl="0" eaLnBrk="1" latinLnBrk="0" hangingPunct="1">
+      <a:defRPr sz="1200" kern="1200">
+        <a:solidFill>
+          <a:schemeClr val="tx1"/>
+        </a:solidFill>
+        <a:latin typeface="+mn-lt"/>
+        <a:ea typeface="+mn-ea"/>
+        <a:cs typeface="+mn-cs"/>
+      </a:defRPr>
+    </a:lvl5pPr>
+    <a:lvl6pPr marL="2286000" algn="l" defTabSz="914400" rtl="0" eaLnBrk="1" latinLnBrk="0" hangingPunct="1">
+      <a:defRPr sz="1200" kern="1200">
+        <a:solidFill>
+          <a:schemeClr val="tx1"/>
+        </a:solidFill>
+        <a:latin typeface="+mn-lt"/>
+        <a:ea typeface="+mn-ea"/>
+        <a:cs typeface="+mn-cs"/>
+      </a:defRPr>
+    </a:lvl6pPr>
+    <a:lvl7pPr marL="2743200" algn="l" defTabSz="914400" rtl="0" eaLnBrk="1" latinLnBrk="0" hangingPunct="1">
+      <a:defRPr sz="1200" kern="1200">
+        <a:solidFill>
+          <a:schemeClr val="tx1"/>
+        </a:solidFill>
+        <a:latin typeface="+mn-lt"/>
+        <a:ea typeface="+mn-ea"/>
+        <a:cs typeface="+mn-cs"/>
+      </a:defRPr>
+    </a:lvl7pPr>
+    <a:lvl8pPr marL="3200400" algn="l" defTabSz="914400" rtl="0" eaLnBrk="1" latinLnBrk="0" hangingPunct="1">
+      <a:defRPr sz="1200" kern="1200">
+        <a:solidFill>
+          <a:schemeClr val="tx1"/>
+        </a:solidFill>
+        <a:latin typeface="+mn-lt"/>
+        <a:ea typeface="+mn-ea"/>
+        <a:cs typeface="+mn-cs"/>
+      </a:defRPr>
+    </a:lvl8pPr>
+    <a:lvl9pPr marL="3657600" algn="l" defTabSz="914400" rtl="0" eaLnBrk="1" latinLnBrk="0" hangingPunct="1">
+      <a:defRPr sz="1200" kern="1200">
+        <a:solidFill>
+          <a:schemeClr val="tx1"/>
+        </a:solidFill>
+        <a:latin typeface="+mn-lt"/>
+        <a:ea typeface="+mn-ea"/>
+        <a:cs typeface="+mn-cs"/>
+      </a:defRPr>
+    </a:lvl9pPr>
+  </p:notesStyle>
+</p:notesMaster>
+</file>
+
 <file path=ppt/slideLayouts/slideLayout1.xml><?xml version="1.0" encoding="utf-8"?>
 <p:sldLayout xmlns:a="http://schemas.openxmlformats.org/drawingml/2006/main" xmlns:r="http://schemas.openxmlformats.org/officeDocument/2006/relationships" xmlns:p="http://schemas.openxmlformats.org/presentationml/2006/main" type="title" preserve="1">
   <p:cSld name="Title Slide">
@@ -305,7 +659,7 @@
           <a:p>
             <a:fld id="{112B6263-1C9E-486E-9CAD-BBEA19DF4382}" type="datetimeFigureOut">
               <a:rPr lang="en-US" smtClean="0"/>
-              <a:t>2/15/17</a:t>
+              <a:t>6/30/17</a:t>
             </a:fld>
             <a:endParaRPr lang="en-US"/>
           </a:p>
@@ -475,7 +829,7 @@
           <a:p>
             <a:fld id="{112B6263-1C9E-486E-9CAD-BBEA19DF4382}" type="datetimeFigureOut">
               <a:rPr lang="en-US" smtClean="0"/>
-              <a:t>2/15/17</a:t>
+              <a:t>6/30/17</a:t>
             </a:fld>
             <a:endParaRPr lang="en-US"/>
           </a:p>
@@ -655,7 +1009,7 @@
           <a:p>
             <a:fld id="{112B6263-1C9E-486E-9CAD-BBEA19DF4382}" type="datetimeFigureOut">
               <a:rPr lang="en-US" smtClean="0"/>
-              <a:t>2/15/17</a:t>
+              <a:t>6/30/17</a:t>
             </a:fld>
             <a:endParaRPr lang="en-US"/>
           </a:p>
@@ -825,7 +1179,7 @@
           <a:p>
             <a:fld id="{112B6263-1C9E-486E-9CAD-BBEA19DF4382}" type="datetimeFigureOut">
               <a:rPr lang="en-US" smtClean="0"/>
-              <a:t>2/15/17</a:t>
+              <a:t>6/30/17</a:t>
             </a:fld>
             <a:endParaRPr lang="en-US"/>
           </a:p>
@@ -1071,7 +1425,7 @@
           <a:p>
             <a:fld id="{112B6263-1C9E-486E-9CAD-BBEA19DF4382}" type="datetimeFigureOut">
               <a:rPr lang="en-US" smtClean="0"/>
-              <a:t>2/15/17</a:t>
+              <a:t>6/30/17</a:t>
             </a:fld>
             <a:endParaRPr lang="en-US"/>
           </a:p>
@@ -1359,7 +1713,7 @@
           <a:p>
             <a:fld id="{112B6263-1C9E-486E-9CAD-BBEA19DF4382}" type="datetimeFigureOut">
               <a:rPr lang="en-US" smtClean="0"/>
-              <a:t>2/15/17</a:t>
+              <a:t>6/30/17</a:t>
             </a:fld>
             <a:endParaRPr lang="en-US"/>
           </a:p>
@@ -1781,7 +2135,7 @@
           <a:p>
             <a:fld id="{112B6263-1C9E-486E-9CAD-BBEA19DF4382}" type="datetimeFigureOut">
               <a:rPr lang="en-US" smtClean="0"/>
-              <a:t>2/15/17</a:t>
+              <a:t>6/30/17</a:t>
             </a:fld>
             <a:endParaRPr lang="en-US"/>
           </a:p>
@@ -1899,7 +2253,7 @@
           <a:p>
             <a:fld id="{112B6263-1C9E-486E-9CAD-BBEA19DF4382}" type="datetimeFigureOut">
               <a:rPr lang="en-US" smtClean="0"/>
-              <a:t>2/15/17</a:t>
+              <a:t>6/30/17</a:t>
             </a:fld>
             <a:endParaRPr lang="en-US"/>
           </a:p>
@@ -1994,7 +2348,7 @@
           <a:p>
             <a:fld id="{112B6263-1C9E-486E-9CAD-BBEA19DF4382}" type="datetimeFigureOut">
               <a:rPr lang="en-US" smtClean="0"/>
-              <a:t>2/15/17</a:t>
+              <a:t>6/30/17</a:t>
             </a:fld>
             <a:endParaRPr lang="en-US"/>
           </a:p>
@@ -2271,7 +2625,7 @@
           <a:p>
             <a:fld id="{112B6263-1C9E-486E-9CAD-BBEA19DF4382}" type="datetimeFigureOut">
               <a:rPr lang="en-US" smtClean="0"/>
-              <a:t>2/15/17</a:t>
+              <a:t>6/30/17</a:t>
             </a:fld>
             <a:endParaRPr lang="en-US"/>
           </a:p>
@@ -2524,7 +2878,7 @@
           <a:p>
             <a:fld id="{112B6263-1C9E-486E-9CAD-BBEA19DF4382}" type="datetimeFigureOut">
               <a:rPr lang="en-US" smtClean="0"/>
-              <a:t>2/15/17</a:t>
+              <a:t>6/30/17</a:t>
             </a:fld>
             <a:endParaRPr lang="en-US"/>
           </a:p>
@@ -2737,7 +3091,7 @@
           <a:p>
             <a:fld id="{112B6263-1C9E-486E-9CAD-BBEA19DF4382}" type="datetimeFigureOut">
               <a:rPr lang="en-US" smtClean="0"/>
-              <a:t>2/15/17</a:t>
+              <a:t>6/30/17</a:t>
             </a:fld>
             <a:endParaRPr lang="en-US"/>
           </a:p>
@@ -6491,16 +6845,606 @@
           </a:p>
         </p:txBody>
       </p:sp>
+      <p:sp>
+        <p:nvSpPr>
+          <p:cNvPr id="34" name="TextBox 33"/>
+          <p:cNvSpPr txBox="1"/>
+          <p:nvPr/>
+        </p:nvSpPr>
+        <p:spPr>
+          <a:xfrm>
+            <a:off x="0" y="2"/>
+            <a:ext cx="766485" cy="288698"/>
+          </a:xfrm>
+          <a:prstGeom prst="rect">
+            <a:avLst/>
+          </a:prstGeom>
+          <a:noFill/>
+        </p:spPr>
+        <p:txBody>
+          <a:bodyPr wrap="none" lIns="57305" tIns="28653" rIns="57305" bIns="28653" rtlCol="0">
+            <a:spAutoFit/>
+          </a:bodyPr>
+          <a:lstStyle/>
+          <a:p>
+            <a:r>
+              <a:rPr lang="en-US" sz="1500" b="1" dirty="0"/>
+              <a:t>PANEL </a:t>
+            </a:r>
+            <a:r>
+              <a:rPr lang="en-US" sz="1500" b="1" dirty="0" smtClean="0"/>
+              <a:t>2</a:t>
+            </a:r>
+            <a:endParaRPr lang="en-US" sz="1500" b="1" dirty="0"/>
+          </a:p>
+        </p:txBody>
+      </p:sp>
+    </p:spTree>
+    <p:extLst>
+      <p:ext uri="{BB962C8B-B14F-4D97-AF65-F5344CB8AC3E}">
+        <p14:creationId xmlns:p14="http://schemas.microsoft.com/office/powerpoint/2010/main" val="2393645102"/>
+      </p:ext>
+    </p:extLst>
+  </p:cSld>
+  <p:clrMapOvr>
+    <a:masterClrMapping/>
+  </p:clrMapOvr>
+</p:sld>
+</file>
+
+<file path=ppt/slides/slide3.xml><?xml version="1.0" encoding="utf-8"?>
+<p:sld xmlns:a="http://schemas.openxmlformats.org/drawingml/2006/main" xmlns:r="http://schemas.openxmlformats.org/officeDocument/2006/relationships" xmlns:p="http://schemas.openxmlformats.org/presentationml/2006/main">
+  <p:cSld>
+    <p:spTree>
+      <p:nvGrpSpPr>
+        <p:cNvPr id="1" name=""/>
+        <p:cNvGrpSpPr/>
+        <p:nvPr/>
+      </p:nvGrpSpPr>
+      <p:grpSpPr>
+        <a:xfrm>
+          <a:off x="0" y="0"/>
+          <a:ext cx="0" cy="0"/>
+          <a:chOff x="0" y="0"/>
+          <a:chExt cx="0" cy="0"/>
+        </a:xfrm>
+      </p:grpSpPr>
+      <p:sp>
+        <p:nvSpPr>
+          <p:cNvPr id="2" name="TextBox 1"/>
+          <p:cNvSpPr txBox="1"/>
+          <p:nvPr/>
+        </p:nvSpPr>
+        <p:spPr>
+          <a:xfrm>
+            <a:off x="4310544" y="123816"/>
+            <a:ext cx="522912" cy="180984"/>
+          </a:xfrm>
+          <a:prstGeom prst="rect">
+            <a:avLst/>
+          </a:prstGeom>
+          <a:noFill/>
+          <a:ln>
+            <a:solidFill>
+              <a:schemeClr val="tx1"/>
+            </a:solidFill>
+          </a:ln>
+        </p:spPr>
+        <p:txBody>
+          <a:bodyPr wrap="none" lIns="57315" tIns="28657" rIns="57315" bIns="28657" rtlCol="0">
+            <a:spAutoFit/>
+          </a:bodyPr>
+          <a:lstStyle/>
+          <a:p>
+            <a:r>
+              <a:rPr lang="en-US" sz="800" dirty="0"/>
+              <a:t>All events</a:t>
+            </a:r>
+          </a:p>
+        </p:txBody>
+      </p:sp>
+      <p:sp>
+        <p:nvSpPr>
+          <p:cNvPr id="3" name="TextBox 2"/>
+          <p:cNvSpPr txBox="1"/>
+          <p:nvPr/>
+        </p:nvSpPr>
+        <p:spPr>
+          <a:xfrm>
+            <a:off x="3928896" y="1895520"/>
+            <a:ext cx="1467081" cy="180984"/>
+          </a:xfrm>
+          <a:prstGeom prst="rect">
+            <a:avLst/>
+          </a:prstGeom>
+          <a:noFill/>
+          <a:ln>
+            <a:solidFill>
+              <a:schemeClr val="tx1"/>
+            </a:solidFill>
+          </a:ln>
+        </p:spPr>
+        <p:txBody>
+          <a:bodyPr wrap="none" lIns="57315" tIns="28657" rIns="57315" bIns="28657" rtlCol="0">
+            <a:spAutoFit/>
+          </a:bodyPr>
+          <a:lstStyle/>
+          <a:p>
+            <a:r>
+              <a:rPr lang="en-US" sz="800" dirty="0" smtClean="0"/>
+              <a:t>Live Single PBMCs </a:t>
+            </a:r>
+            <a:r>
+              <a:rPr lang="en-US" sz="800" dirty="0" smtClean="0"/>
+              <a:t>(SSC-A/FSC-A)</a:t>
+            </a:r>
+            <a:endParaRPr lang="en-US" sz="800" dirty="0"/>
+          </a:p>
+        </p:txBody>
+      </p:sp>
+      <p:sp>
+        <p:nvSpPr>
+          <p:cNvPr id="4" name="TextBox 3"/>
+          <p:cNvSpPr txBox="1"/>
+          <p:nvPr/>
+        </p:nvSpPr>
+        <p:spPr>
+          <a:xfrm>
+            <a:off x="3700376" y="1366919"/>
+            <a:ext cx="1742798" cy="180984"/>
+          </a:xfrm>
+          <a:prstGeom prst="rect">
+            <a:avLst/>
+          </a:prstGeom>
+          <a:noFill/>
+          <a:ln>
+            <a:solidFill>
+              <a:schemeClr val="tx1"/>
+            </a:solidFill>
+          </a:ln>
+        </p:spPr>
+        <p:txBody>
+          <a:bodyPr wrap="none" lIns="57315" tIns="28657" rIns="57315" bIns="28657" rtlCol="0">
+            <a:spAutoFit/>
+          </a:bodyPr>
+          <a:lstStyle/>
+          <a:p>
+            <a:r>
+              <a:rPr lang="en-US" sz="800" dirty="0"/>
+              <a:t>Live Single immune </a:t>
+            </a:r>
+            <a:r>
+              <a:rPr lang="en-US" sz="800" dirty="0" smtClean="0"/>
+              <a:t>cells(FSC-H/FSC-W</a:t>
+            </a:r>
+            <a:r>
+              <a:rPr lang="en-US" sz="800" dirty="0" smtClean="0"/>
+              <a:t>)</a:t>
+            </a:r>
+            <a:endParaRPr lang="en-US" sz="800" dirty="0"/>
+          </a:p>
+        </p:txBody>
+      </p:sp>
+      <p:sp>
+        <p:nvSpPr>
+          <p:cNvPr id="5" name="TextBox 4"/>
+          <p:cNvSpPr txBox="1"/>
+          <p:nvPr/>
+        </p:nvSpPr>
+        <p:spPr>
+          <a:xfrm>
+            <a:off x="3886324" y="571607"/>
+            <a:ext cx="1367695" cy="180984"/>
+          </a:xfrm>
+          <a:prstGeom prst="rect">
+            <a:avLst/>
+          </a:prstGeom>
+          <a:noFill/>
+          <a:ln>
+            <a:solidFill>
+              <a:schemeClr val="tx1"/>
+            </a:solidFill>
+          </a:ln>
+        </p:spPr>
+        <p:txBody>
+          <a:bodyPr wrap="none" lIns="57315" tIns="28657" rIns="57315" bIns="28657" rtlCol="0">
+            <a:spAutoFit/>
+          </a:bodyPr>
+          <a:lstStyle/>
+          <a:p>
+            <a:r>
+              <a:rPr lang="en-US" sz="800" dirty="0" smtClean="0"/>
+              <a:t>Live immune cells </a:t>
+            </a:r>
+            <a:r>
+              <a:rPr lang="en-US" sz="800" dirty="0" smtClean="0"/>
+              <a:t>(CD45</a:t>
+            </a:r>
+            <a:r>
+              <a:rPr lang="en-US" sz="800" dirty="0"/>
+              <a:t>+ </a:t>
+            </a:r>
+            <a:r>
+              <a:rPr lang="en-US" sz="800" dirty="0" smtClean="0"/>
+              <a:t>PE-)</a:t>
+            </a:r>
+            <a:endParaRPr lang="en-US" sz="800" dirty="0"/>
+          </a:p>
+        </p:txBody>
+      </p:sp>
+      <p:sp>
+        <p:nvSpPr>
+          <p:cNvPr id="6" name="TextBox 5"/>
+          <p:cNvSpPr txBox="1"/>
+          <p:nvPr/>
+        </p:nvSpPr>
+        <p:spPr>
+          <a:xfrm>
+            <a:off x="4141427" y="2320418"/>
+            <a:ext cx="861146" cy="550316"/>
+          </a:xfrm>
+          <a:prstGeom prst="rect">
+            <a:avLst/>
+          </a:prstGeom>
+          <a:noFill/>
+          <a:ln>
+            <a:solidFill>
+              <a:schemeClr val="tx1"/>
+            </a:solidFill>
+          </a:ln>
+        </p:spPr>
+        <p:txBody>
+          <a:bodyPr wrap="none" lIns="57315" tIns="28657" rIns="57315" bIns="28657" rtlCol="0">
+            <a:spAutoFit/>
+          </a:bodyPr>
+          <a:lstStyle/>
+          <a:p>
+            <a:r>
+              <a:rPr lang="en-US" sz="800" dirty="0"/>
+              <a:t>Dendritic cells </a:t>
+            </a:r>
+          </a:p>
+          <a:p>
+            <a:r>
+              <a:rPr lang="en-US" sz="800" dirty="0"/>
+              <a:t>Natural killer cells</a:t>
+            </a:r>
+          </a:p>
+          <a:p>
+            <a:r>
+              <a:rPr lang="en-US" sz="800" dirty="0"/>
+              <a:t>Monocytes</a:t>
+            </a:r>
+          </a:p>
+          <a:p>
+            <a:r>
+              <a:rPr lang="en-US" sz="800" dirty="0" smtClean="0"/>
+              <a:t>(CD3- CD19-)</a:t>
+            </a:r>
+            <a:endParaRPr lang="en-US" sz="800" dirty="0"/>
+          </a:p>
+        </p:txBody>
+      </p:sp>
+      <p:sp>
+        <p:nvSpPr>
+          <p:cNvPr id="7" name="TextBox 6"/>
+          <p:cNvSpPr txBox="1"/>
+          <p:nvPr/>
+        </p:nvSpPr>
+        <p:spPr>
+          <a:xfrm>
+            <a:off x="6553200" y="3455798"/>
+            <a:ext cx="1288787" cy="304095"/>
+          </a:xfrm>
+          <a:prstGeom prst="rect">
+            <a:avLst/>
+          </a:prstGeom>
+          <a:noFill/>
+          <a:ln>
+            <a:solidFill>
+              <a:schemeClr val="tx1"/>
+            </a:solidFill>
+          </a:ln>
+        </p:spPr>
+        <p:txBody>
+          <a:bodyPr wrap="square" lIns="57315" tIns="28657" rIns="57315" bIns="28657" rtlCol="0">
+            <a:spAutoFit/>
+          </a:bodyPr>
+          <a:lstStyle/>
+          <a:p>
+            <a:r>
+              <a:rPr lang="en-US" sz="800" dirty="0"/>
+              <a:t>Dendritic and natural killer </a:t>
+            </a:r>
+            <a:r>
+              <a:rPr lang="en-US" sz="800" dirty="0" smtClean="0"/>
+              <a:t>cells (CD14- CD20-)</a:t>
+            </a:r>
+            <a:endParaRPr lang="en-US" sz="800" dirty="0"/>
+          </a:p>
+        </p:txBody>
+      </p:sp>
+      <p:sp>
+        <p:nvSpPr>
+          <p:cNvPr id="8" name="TextBox 7"/>
+          <p:cNvSpPr txBox="1"/>
+          <p:nvPr/>
+        </p:nvSpPr>
+        <p:spPr>
+          <a:xfrm>
+            <a:off x="1064732" y="3517353"/>
+            <a:ext cx="936487" cy="180984"/>
+          </a:xfrm>
+          <a:prstGeom prst="rect">
+            <a:avLst/>
+          </a:prstGeom>
+          <a:noFill/>
+          <a:ln>
+            <a:solidFill>
+              <a:schemeClr val="tx1"/>
+            </a:solidFill>
+          </a:ln>
+        </p:spPr>
+        <p:txBody>
+          <a:bodyPr wrap="none" lIns="57315" tIns="28657" rIns="57315" bIns="28657" rtlCol="0">
+            <a:spAutoFit/>
+          </a:bodyPr>
+          <a:lstStyle/>
+          <a:p>
+            <a:r>
+              <a:rPr lang="en-US" sz="800" dirty="0"/>
+              <a:t>Monocytes </a:t>
+            </a:r>
+            <a:r>
+              <a:rPr lang="en-US" sz="800" dirty="0" smtClean="0"/>
+              <a:t>(CD14+)</a:t>
+            </a:r>
+            <a:endParaRPr lang="en-US" sz="800" dirty="0"/>
+          </a:p>
+        </p:txBody>
+      </p:sp>
+      <p:sp>
+        <p:nvSpPr>
+          <p:cNvPr id="9" name="TextBox 8"/>
+          <p:cNvSpPr txBox="1"/>
+          <p:nvPr/>
+        </p:nvSpPr>
+        <p:spPr>
+          <a:xfrm>
+            <a:off x="228600" y="4498761"/>
+            <a:ext cx="947708" cy="304095"/>
+          </a:xfrm>
+          <a:prstGeom prst="rect">
+            <a:avLst/>
+          </a:prstGeom>
+          <a:noFill/>
+          <a:ln>
+            <a:solidFill>
+              <a:schemeClr val="tx1"/>
+            </a:solidFill>
+          </a:ln>
+        </p:spPr>
+        <p:txBody>
+          <a:bodyPr wrap="none" lIns="57315" tIns="28657" rIns="57315" bIns="28657" rtlCol="0">
+            <a:spAutoFit/>
+          </a:bodyPr>
+          <a:lstStyle/>
+          <a:p>
+            <a:r>
+              <a:rPr lang="en-US" sz="800" dirty="0"/>
+              <a:t>Classical monocytes</a:t>
+            </a:r>
+          </a:p>
+          <a:p>
+            <a:r>
+              <a:rPr lang="en-US" sz="800" dirty="0" smtClean="0"/>
+              <a:t>(CD14</a:t>
+            </a:r>
+            <a:r>
+              <a:rPr lang="en-US" sz="800" dirty="0"/>
+              <a:t>+ </a:t>
+            </a:r>
+            <a:r>
+              <a:rPr lang="en-US" sz="800" dirty="0" smtClean="0"/>
+              <a:t>CD16-)</a:t>
+            </a:r>
+            <a:endParaRPr lang="en-US" sz="800" dirty="0"/>
+          </a:p>
+        </p:txBody>
+      </p:sp>
+      <p:sp>
+        <p:nvSpPr>
+          <p:cNvPr id="10" name="TextBox 9"/>
+          <p:cNvSpPr txBox="1"/>
+          <p:nvPr/>
+        </p:nvSpPr>
+        <p:spPr>
+          <a:xfrm>
+            <a:off x="1806956" y="4498762"/>
+            <a:ext cx="1241044" cy="304095"/>
+          </a:xfrm>
+          <a:prstGeom prst="rect">
+            <a:avLst/>
+          </a:prstGeom>
+          <a:noFill/>
+          <a:ln>
+            <a:solidFill>
+              <a:schemeClr val="tx1"/>
+            </a:solidFill>
+          </a:ln>
+        </p:spPr>
+        <p:txBody>
+          <a:bodyPr wrap="square" lIns="57315" tIns="28657" rIns="57315" bIns="28657" rtlCol="0">
+            <a:spAutoFit/>
+          </a:bodyPr>
+          <a:lstStyle/>
+          <a:p>
+            <a:r>
+              <a:rPr lang="en-US" sz="800" dirty="0"/>
+              <a:t>Non classical monocytes</a:t>
+            </a:r>
+          </a:p>
+          <a:p>
+            <a:r>
+              <a:rPr lang="en-US" sz="800" dirty="0" smtClean="0"/>
+              <a:t>(CD14</a:t>
+            </a:r>
+            <a:r>
+              <a:rPr lang="en-US" sz="800" dirty="0"/>
+              <a:t>+ CD16</a:t>
+            </a:r>
+            <a:r>
+              <a:rPr lang="en-US" sz="800" dirty="0" smtClean="0"/>
+              <a:t>+)</a:t>
+            </a:r>
+            <a:endParaRPr lang="en-US" sz="800" dirty="0"/>
+          </a:p>
+        </p:txBody>
+      </p:sp>
+      <p:sp>
+        <p:nvSpPr>
+          <p:cNvPr id="11" name="TextBox 10"/>
+          <p:cNvSpPr txBox="1"/>
+          <p:nvPr/>
+        </p:nvSpPr>
+        <p:spPr>
+          <a:xfrm>
+            <a:off x="7315200" y="4130793"/>
+            <a:ext cx="1371600" cy="180984"/>
+          </a:xfrm>
+          <a:prstGeom prst="rect">
+            <a:avLst/>
+          </a:prstGeom>
+          <a:noFill/>
+          <a:ln>
+            <a:solidFill>
+              <a:schemeClr val="tx1"/>
+            </a:solidFill>
+          </a:ln>
+        </p:spPr>
+        <p:txBody>
+          <a:bodyPr wrap="square" lIns="57315" tIns="28657" rIns="57315" bIns="28657" rtlCol="0">
+            <a:spAutoFit/>
+          </a:bodyPr>
+          <a:lstStyle/>
+          <a:p>
+            <a:r>
+              <a:rPr lang="en-US" sz="800" dirty="0"/>
+              <a:t>Natural Killer cells </a:t>
+            </a:r>
+            <a:r>
+              <a:rPr lang="en-US" sz="800" dirty="0" smtClean="0"/>
+              <a:t>(CD16+)</a:t>
+            </a:r>
+            <a:endParaRPr lang="en-US" sz="800" dirty="0"/>
+          </a:p>
+        </p:txBody>
+      </p:sp>
+      <p:sp>
+        <p:nvSpPr>
+          <p:cNvPr id="12" name="TextBox 11"/>
+          <p:cNvSpPr txBox="1"/>
+          <p:nvPr/>
+        </p:nvSpPr>
+        <p:spPr>
+          <a:xfrm>
+            <a:off x="4953349" y="4130793"/>
+            <a:ext cx="1253487" cy="180984"/>
+          </a:xfrm>
+          <a:prstGeom prst="rect">
+            <a:avLst/>
+          </a:prstGeom>
+          <a:noFill/>
+          <a:ln>
+            <a:solidFill>
+              <a:schemeClr val="tx1"/>
+            </a:solidFill>
+          </a:ln>
+        </p:spPr>
+        <p:txBody>
+          <a:bodyPr wrap="square" lIns="57315" tIns="28657" rIns="57315" bIns="28657" rtlCol="0">
+            <a:spAutoFit/>
+          </a:bodyPr>
+          <a:lstStyle/>
+          <a:p>
+            <a:r>
+              <a:rPr lang="en-US" sz="800" dirty="0"/>
+              <a:t>Dendritic cells </a:t>
+            </a:r>
+            <a:r>
+              <a:rPr lang="en-US" sz="800" dirty="0" smtClean="0"/>
+              <a:t>(HLA-DR+)</a:t>
+            </a:r>
+            <a:endParaRPr lang="en-US" sz="800" dirty="0"/>
+          </a:p>
+        </p:txBody>
+      </p:sp>
+      <p:sp>
+        <p:nvSpPr>
+          <p:cNvPr id="13" name="TextBox 12"/>
+          <p:cNvSpPr txBox="1"/>
+          <p:nvPr/>
+        </p:nvSpPr>
+        <p:spPr>
+          <a:xfrm>
+            <a:off x="5669868" y="5285723"/>
+            <a:ext cx="1445546" cy="304095"/>
+          </a:xfrm>
+          <a:prstGeom prst="rect">
+            <a:avLst/>
+          </a:prstGeom>
+          <a:noFill/>
+          <a:ln>
+            <a:solidFill>
+              <a:schemeClr val="tx1"/>
+            </a:solidFill>
+          </a:ln>
+        </p:spPr>
+        <p:txBody>
+          <a:bodyPr wrap="square" lIns="57315" tIns="28657" rIns="57315" bIns="28657" rtlCol="0">
+            <a:spAutoFit/>
+          </a:bodyPr>
+          <a:lstStyle/>
+          <a:p>
+            <a:r>
+              <a:rPr lang="en-US" sz="800" dirty="0" err="1"/>
+              <a:t>Plasmacytoid</a:t>
+            </a:r>
+            <a:r>
+              <a:rPr lang="en-US" sz="800" dirty="0"/>
+              <a:t> dendritic cells</a:t>
+            </a:r>
+          </a:p>
+          <a:p>
+            <a:r>
+              <a:rPr lang="en-US" sz="800" dirty="0" smtClean="0"/>
+              <a:t>(CD11C- </a:t>
+            </a:r>
+            <a:r>
+              <a:rPr lang="en-US" sz="800" dirty="0"/>
+              <a:t>CD123</a:t>
+            </a:r>
+            <a:r>
+              <a:rPr lang="en-US" sz="800" dirty="0" smtClean="0"/>
+              <a:t>+)</a:t>
+            </a:r>
+            <a:endParaRPr lang="en-US" sz="800" dirty="0"/>
+          </a:p>
+        </p:txBody>
+      </p:sp>
       <p:cxnSp>
         <p:nvCxnSpPr>
-          <p:cNvPr id="32" name="Straight Arrow Connector 31"/>
-          <p:cNvCxnSpPr/>
+          <p:cNvPr id="14" name="Straight Arrow Connector 13"/>
+          <p:cNvCxnSpPr>
+            <a:stCxn id="5" idx="2"/>
+            <a:endCxn id="4" idx="0"/>
+          </p:cNvCxnSpPr>
           <p:nvPr/>
         </p:nvCxnSpPr>
         <p:spPr>
           <a:xfrm>
-            <a:off x="1806956" y="1295400"/>
-            <a:ext cx="2286381" cy="1025018"/>
+            <a:off x="4570172" y="752591"/>
+            <a:ext cx="1603" cy="614328"/>
           </a:xfrm>
           <a:prstGeom prst="straightConnector1">
             <a:avLst/>
@@ -6510,13 +7454,13 @@
           </a:ln>
         </p:spPr>
         <p:style>
-          <a:lnRef idx="3">
+          <a:lnRef idx="1">
             <a:schemeClr val="dk1"/>
           </a:lnRef>
           <a:fillRef idx="0">
             <a:schemeClr val="dk1"/>
           </a:fillRef>
-          <a:effectRef idx="2">
+          <a:effectRef idx="0">
             <a:schemeClr val="dk1"/>
           </a:effectRef>
           <a:fontRef idx="minor">
@@ -6524,16 +7468,477 @@
           </a:fontRef>
         </p:style>
       </p:cxnSp>
-      <p:sp>
-        <p:nvSpPr>
-          <p:cNvPr id="33" name="TextBox 32"/>
+      <p:cxnSp>
+        <p:nvCxnSpPr>
+          <p:cNvPr id="15" name="Straight Arrow Connector 14"/>
+          <p:cNvCxnSpPr>
+            <a:stCxn id="6" idx="1"/>
+            <a:endCxn id="8" idx="0"/>
+          </p:cNvCxnSpPr>
+          <p:nvPr/>
+        </p:nvCxnSpPr>
+        <p:spPr>
+          <a:xfrm flipH="1">
+            <a:off x="1532976" y="2595576"/>
+            <a:ext cx="2608451" cy="921777"/>
+          </a:xfrm>
+          <a:prstGeom prst="straightConnector1">
+            <a:avLst/>
+          </a:prstGeom>
+          <a:ln>
+            <a:tailEnd type="triangle"/>
+          </a:ln>
+        </p:spPr>
+        <p:style>
+          <a:lnRef idx="1">
+            <a:schemeClr val="dk1"/>
+          </a:lnRef>
+          <a:fillRef idx="0">
+            <a:schemeClr val="dk1"/>
+          </a:fillRef>
+          <a:effectRef idx="0">
+            <a:schemeClr val="dk1"/>
+          </a:effectRef>
+          <a:fontRef idx="minor">
+            <a:schemeClr val="tx1"/>
+          </a:fontRef>
+        </p:style>
+      </p:cxnSp>
+      <p:cxnSp>
+        <p:nvCxnSpPr>
+          <p:cNvPr id="16" name="Straight Arrow Connector 15"/>
+          <p:cNvCxnSpPr>
+            <a:stCxn id="6" idx="3"/>
+            <a:endCxn id="7" idx="0"/>
+          </p:cNvCxnSpPr>
+          <p:nvPr/>
+        </p:nvCxnSpPr>
+        <p:spPr>
+          <a:xfrm>
+            <a:off x="5002573" y="2595576"/>
+            <a:ext cx="2195021" cy="860222"/>
+          </a:xfrm>
+          <a:prstGeom prst="straightConnector1">
+            <a:avLst/>
+          </a:prstGeom>
+          <a:ln>
+            <a:tailEnd type="triangle"/>
+          </a:ln>
+        </p:spPr>
+        <p:style>
+          <a:lnRef idx="1">
+            <a:schemeClr val="dk1"/>
+          </a:lnRef>
+          <a:fillRef idx="0">
+            <a:schemeClr val="dk1"/>
+          </a:fillRef>
+          <a:effectRef idx="0">
+            <a:schemeClr val="dk1"/>
+          </a:effectRef>
+          <a:fontRef idx="minor">
+            <a:schemeClr val="tx1"/>
+          </a:fontRef>
+        </p:style>
+      </p:cxnSp>
+      <p:cxnSp>
+        <p:nvCxnSpPr>
+          <p:cNvPr id="17" name="Straight Arrow Connector 16"/>
+          <p:cNvCxnSpPr>
+            <a:stCxn id="8" idx="2"/>
+            <a:endCxn id="10" idx="0"/>
+          </p:cNvCxnSpPr>
+          <p:nvPr/>
+        </p:nvCxnSpPr>
+        <p:spPr>
+          <a:xfrm>
+            <a:off x="1532976" y="3698337"/>
+            <a:ext cx="894502" cy="800425"/>
+          </a:xfrm>
+          <a:prstGeom prst="straightConnector1">
+            <a:avLst/>
+          </a:prstGeom>
+          <a:ln>
+            <a:tailEnd type="triangle"/>
+          </a:ln>
+        </p:spPr>
+        <p:style>
+          <a:lnRef idx="1">
+            <a:schemeClr val="dk1"/>
+          </a:lnRef>
+          <a:fillRef idx="0">
+            <a:schemeClr val="dk1"/>
+          </a:fillRef>
+          <a:effectRef idx="0">
+            <a:schemeClr val="dk1"/>
+          </a:effectRef>
+          <a:fontRef idx="minor">
+            <a:schemeClr val="tx1"/>
+          </a:fontRef>
+        </p:style>
+      </p:cxnSp>
+      <p:cxnSp>
+        <p:nvCxnSpPr>
+          <p:cNvPr id="18" name="Straight Arrow Connector 17"/>
+          <p:cNvCxnSpPr>
+            <a:stCxn id="8" idx="2"/>
+            <a:endCxn id="9" idx="0"/>
+          </p:cNvCxnSpPr>
+          <p:nvPr/>
+        </p:nvCxnSpPr>
+        <p:spPr>
+          <a:xfrm flipH="1">
+            <a:off x="702454" y="3698337"/>
+            <a:ext cx="830522" cy="800424"/>
+          </a:xfrm>
+          <a:prstGeom prst="straightConnector1">
+            <a:avLst/>
+          </a:prstGeom>
+          <a:ln>
+            <a:tailEnd type="triangle"/>
+          </a:ln>
+        </p:spPr>
+        <p:style>
+          <a:lnRef idx="1">
+            <a:schemeClr val="dk1"/>
+          </a:lnRef>
+          <a:fillRef idx="0">
+            <a:schemeClr val="dk1"/>
+          </a:fillRef>
+          <a:effectRef idx="0">
+            <a:schemeClr val="dk1"/>
+          </a:effectRef>
+          <a:fontRef idx="minor">
+            <a:schemeClr val="tx1"/>
+          </a:fontRef>
+        </p:style>
+      </p:cxnSp>
+      <p:cxnSp>
+        <p:nvCxnSpPr>
+          <p:cNvPr id="19" name="Straight Arrow Connector 18"/>
+          <p:cNvCxnSpPr>
+            <a:stCxn id="7" idx="2"/>
+            <a:endCxn id="12" idx="0"/>
+          </p:cNvCxnSpPr>
+          <p:nvPr/>
+        </p:nvCxnSpPr>
+        <p:spPr>
+          <a:xfrm flipH="1">
+            <a:off x="5580093" y="3759893"/>
+            <a:ext cx="1617501" cy="370900"/>
+          </a:xfrm>
+          <a:prstGeom prst="straightConnector1">
+            <a:avLst/>
+          </a:prstGeom>
+          <a:ln>
+            <a:tailEnd type="triangle"/>
+          </a:ln>
+        </p:spPr>
+        <p:style>
+          <a:lnRef idx="1">
+            <a:schemeClr val="dk1"/>
+          </a:lnRef>
+          <a:fillRef idx="0">
+            <a:schemeClr val="dk1"/>
+          </a:fillRef>
+          <a:effectRef idx="0">
+            <a:schemeClr val="dk1"/>
+          </a:effectRef>
+          <a:fontRef idx="minor">
+            <a:schemeClr val="tx1"/>
+          </a:fontRef>
+        </p:style>
+      </p:cxnSp>
+      <p:cxnSp>
+        <p:nvCxnSpPr>
+          <p:cNvPr id="20" name="Straight Arrow Connector 19"/>
+          <p:cNvCxnSpPr>
+            <a:stCxn id="7" idx="2"/>
+            <a:endCxn id="11" idx="0"/>
+          </p:cNvCxnSpPr>
+          <p:nvPr/>
+        </p:nvCxnSpPr>
+        <p:spPr>
+          <a:xfrm>
+            <a:off x="7197594" y="3759893"/>
+            <a:ext cx="803406" cy="370900"/>
+          </a:xfrm>
+          <a:prstGeom prst="straightConnector1">
+            <a:avLst/>
+          </a:prstGeom>
+          <a:ln>
+            <a:tailEnd type="triangle"/>
+          </a:ln>
+        </p:spPr>
+        <p:style>
+          <a:lnRef idx="1">
+            <a:schemeClr val="dk1"/>
+          </a:lnRef>
+          <a:fillRef idx="0">
+            <a:schemeClr val="dk1"/>
+          </a:fillRef>
+          <a:effectRef idx="0">
+            <a:schemeClr val="dk1"/>
+          </a:effectRef>
+          <a:fontRef idx="minor">
+            <a:schemeClr val="tx1"/>
+          </a:fontRef>
+        </p:style>
+      </p:cxnSp>
+      <p:cxnSp>
+        <p:nvCxnSpPr>
+          <p:cNvPr id="21" name="Straight Arrow Connector 20"/>
+          <p:cNvCxnSpPr>
+            <a:stCxn id="12" idx="2"/>
+            <a:endCxn id="28" idx="0"/>
+          </p:cNvCxnSpPr>
+          <p:nvPr/>
+        </p:nvCxnSpPr>
+        <p:spPr>
+          <a:xfrm flipH="1">
+            <a:off x="4737083" y="4311777"/>
+            <a:ext cx="843010" cy="976469"/>
+          </a:xfrm>
+          <a:prstGeom prst="straightConnector1">
+            <a:avLst/>
+          </a:prstGeom>
+          <a:ln>
+            <a:tailEnd type="triangle"/>
+          </a:ln>
+        </p:spPr>
+        <p:style>
+          <a:lnRef idx="1">
+            <a:schemeClr val="dk1"/>
+          </a:lnRef>
+          <a:fillRef idx="0">
+            <a:schemeClr val="dk1"/>
+          </a:fillRef>
+          <a:effectRef idx="0">
+            <a:schemeClr val="dk1"/>
+          </a:effectRef>
+          <a:fontRef idx="minor">
+            <a:schemeClr val="tx1"/>
+          </a:fontRef>
+        </p:style>
+      </p:cxnSp>
+      <p:cxnSp>
+        <p:nvCxnSpPr>
+          <p:cNvPr id="22" name="Straight Arrow Connector 21"/>
+          <p:cNvCxnSpPr>
+            <a:stCxn id="11" idx="2"/>
+          </p:cNvCxnSpPr>
+          <p:nvPr/>
+        </p:nvCxnSpPr>
+        <p:spPr>
+          <a:xfrm>
+            <a:off x="8001000" y="4311777"/>
+            <a:ext cx="304768" cy="1450921"/>
+          </a:xfrm>
+          <a:prstGeom prst="straightConnector1">
+            <a:avLst/>
+          </a:prstGeom>
+          <a:ln>
+            <a:tailEnd type="triangle"/>
+          </a:ln>
+        </p:spPr>
+        <p:style>
+          <a:lnRef idx="1">
+            <a:schemeClr val="dk1"/>
+          </a:lnRef>
+          <a:fillRef idx="0">
+            <a:schemeClr val="dk1"/>
+          </a:fillRef>
+          <a:effectRef idx="0">
+            <a:schemeClr val="dk1"/>
+          </a:effectRef>
+          <a:fontRef idx="minor">
+            <a:schemeClr val="tx1"/>
+          </a:fontRef>
+        </p:style>
+      </p:cxnSp>
+      <p:cxnSp>
+        <p:nvCxnSpPr>
+          <p:cNvPr id="23" name="Straight Arrow Connector 22"/>
+          <p:cNvCxnSpPr>
+            <a:stCxn id="12" idx="2"/>
+            <a:endCxn id="13" idx="0"/>
+          </p:cNvCxnSpPr>
+          <p:nvPr/>
+        </p:nvCxnSpPr>
+        <p:spPr>
+          <a:xfrm>
+            <a:off x="5580093" y="4311777"/>
+            <a:ext cx="812548" cy="973946"/>
+          </a:xfrm>
+          <a:prstGeom prst="straightConnector1">
+            <a:avLst/>
+          </a:prstGeom>
+          <a:ln>
+            <a:tailEnd type="triangle"/>
+          </a:ln>
+        </p:spPr>
+        <p:style>
+          <a:lnRef idx="1">
+            <a:schemeClr val="dk1"/>
+          </a:lnRef>
+          <a:fillRef idx="0">
+            <a:schemeClr val="dk1"/>
+          </a:fillRef>
+          <a:effectRef idx="0">
+            <a:schemeClr val="dk1"/>
+          </a:effectRef>
+          <a:fontRef idx="minor">
+            <a:schemeClr val="tx1"/>
+          </a:fontRef>
+        </p:style>
+      </p:cxnSp>
+      <p:cxnSp>
+        <p:nvCxnSpPr>
+          <p:cNvPr id="24" name="Straight Arrow Connector 23"/>
+          <p:cNvCxnSpPr>
+            <a:stCxn id="11" idx="2"/>
+          </p:cNvCxnSpPr>
+          <p:nvPr/>
+        </p:nvCxnSpPr>
+        <p:spPr>
+          <a:xfrm flipH="1">
+            <a:off x="7590534" y="4311777"/>
+            <a:ext cx="410466" cy="1450921"/>
+          </a:xfrm>
+          <a:prstGeom prst="straightConnector1">
+            <a:avLst/>
+          </a:prstGeom>
+          <a:ln>
+            <a:tailEnd type="triangle"/>
+          </a:ln>
+        </p:spPr>
+        <p:style>
+          <a:lnRef idx="1">
+            <a:schemeClr val="dk1"/>
+          </a:lnRef>
+          <a:fillRef idx="0">
+            <a:schemeClr val="dk1"/>
+          </a:fillRef>
+          <a:effectRef idx="0">
+            <a:schemeClr val="dk1"/>
+          </a:effectRef>
+          <a:fontRef idx="minor">
+            <a:schemeClr val="tx1"/>
+          </a:fontRef>
+        </p:style>
+      </p:cxnSp>
+      <p:cxnSp>
+        <p:nvCxnSpPr>
+          <p:cNvPr id="25" name="Straight Arrow Connector 24"/>
+          <p:cNvCxnSpPr/>
+          <p:nvPr/>
+        </p:nvCxnSpPr>
+        <p:spPr>
+          <a:xfrm flipH="1">
+            <a:off x="4541092" y="2076504"/>
+            <a:ext cx="450" cy="223976"/>
+          </a:xfrm>
+          <a:prstGeom prst="straightConnector1">
+            <a:avLst/>
+          </a:prstGeom>
+          <a:ln>
+            <a:tailEnd type="triangle"/>
+          </a:ln>
+        </p:spPr>
+        <p:style>
+          <a:lnRef idx="1">
+            <a:schemeClr val="dk1"/>
+          </a:lnRef>
+          <a:fillRef idx="0">
+            <a:schemeClr val="dk1"/>
+          </a:fillRef>
+          <a:effectRef idx="0">
+            <a:schemeClr val="dk1"/>
+          </a:effectRef>
+          <a:fontRef idx="minor">
+            <a:schemeClr val="tx1"/>
+          </a:fontRef>
+        </p:style>
+      </p:cxnSp>
+      <p:cxnSp>
+        <p:nvCxnSpPr>
+          <p:cNvPr id="26" name="Straight Arrow Connector 25"/>
+          <p:cNvCxnSpPr>
+            <a:stCxn id="2" idx="2"/>
+          </p:cNvCxnSpPr>
+          <p:nvPr/>
+        </p:nvCxnSpPr>
+        <p:spPr>
+          <a:xfrm flipH="1">
+            <a:off x="4571775" y="304800"/>
+            <a:ext cx="225" cy="304800"/>
+          </a:xfrm>
+          <a:prstGeom prst="straightConnector1">
+            <a:avLst/>
+          </a:prstGeom>
+          <a:ln>
+            <a:tailEnd type="triangle"/>
+          </a:ln>
+        </p:spPr>
+        <p:style>
+          <a:lnRef idx="1">
+            <a:schemeClr val="dk1"/>
+          </a:lnRef>
+          <a:fillRef idx="0">
+            <a:schemeClr val="dk1"/>
+          </a:fillRef>
+          <a:effectRef idx="0">
+            <a:schemeClr val="dk1"/>
+          </a:effectRef>
+          <a:fontRef idx="minor">
+            <a:schemeClr val="tx1"/>
+          </a:fontRef>
+        </p:style>
+      </p:cxnSp>
+      <p:cxnSp>
+        <p:nvCxnSpPr>
+          <p:cNvPr id="27" name="Straight Arrow Connector 26"/>
+          <p:cNvCxnSpPr>
+            <a:stCxn id="4" idx="2"/>
+          </p:cNvCxnSpPr>
+          <p:nvPr/>
+        </p:nvCxnSpPr>
+        <p:spPr>
+          <a:xfrm flipH="1">
+            <a:off x="4570173" y="1547903"/>
+            <a:ext cx="1602" cy="347617"/>
+          </a:xfrm>
+          <a:prstGeom prst="straightConnector1">
+            <a:avLst/>
+          </a:prstGeom>
+          <a:ln>
+            <a:tailEnd type="triangle"/>
+          </a:ln>
+        </p:spPr>
+        <p:style>
+          <a:lnRef idx="1">
+            <a:schemeClr val="dk1"/>
+          </a:lnRef>
+          <a:fillRef idx="0">
+            <a:schemeClr val="dk1"/>
+          </a:fillRef>
+          <a:effectRef idx="0">
+            <a:schemeClr val="dk1"/>
+          </a:effectRef>
+          <a:fontRef idx="minor">
+            <a:schemeClr val="tx1"/>
+          </a:fontRef>
+        </p:style>
+      </p:cxnSp>
+      <p:sp>
+        <p:nvSpPr>
+          <p:cNvPr id="28" name="TextBox 27"/>
           <p:cNvSpPr txBox="1"/>
           <p:nvPr/>
         </p:nvSpPr>
         <p:spPr>
           <a:xfrm>
-            <a:off x="918296" y="698920"/>
-            <a:ext cx="1507156" cy="427206"/>
+            <a:off x="4180558" y="5288246"/>
+            <a:ext cx="1113050" cy="304095"/>
           </a:xfrm>
           <a:prstGeom prst="rect">
             <a:avLst/>
@@ -6546,36 +7951,167 @@
           </a:ln>
         </p:spPr>
         <p:txBody>
-          <a:bodyPr wrap="none" lIns="57315" tIns="28657" rIns="57315" bIns="28657" rtlCol="0">
+          <a:bodyPr wrap="square" lIns="57315" tIns="28657" rIns="57315" bIns="28657" rtlCol="0">
             <a:spAutoFit/>
           </a:bodyPr>
           <a:lstStyle/>
           <a:p>
             <a:r>
+              <a:rPr lang="en-US" sz="800" dirty="0"/>
+              <a:t>Myeloid dendritic cells </a:t>
+            </a:r>
+            <a:r>
               <a:rPr lang="en-US" sz="800" dirty="0" smtClean="0"/>
-              <a:t>Started Here, I think:</a:t>
-            </a:r>
-          </a:p>
-          <a:p>
+              <a:t>(CD11C</a:t>
+            </a:r>
+            <a:r>
+              <a:rPr lang="en-US" sz="800" dirty="0"/>
+              <a:t>+ </a:t>
+            </a:r>
+            <a:r>
+              <a:rPr lang="en-US" sz="800" dirty="0" smtClean="0"/>
+              <a:t>CD123-)</a:t>
+            </a:r>
             <a:endParaRPr lang="en-US" sz="800" dirty="0"/>
           </a:p>
+        </p:txBody>
+      </p:sp>
+      <p:sp>
+        <p:nvSpPr>
+          <p:cNvPr id="29" name="TextBox 28"/>
+          <p:cNvSpPr txBox="1"/>
+          <p:nvPr/>
+        </p:nvSpPr>
+        <p:spPr>
+          <a:xfrm>
+            <a:off x="6388843" y="5762698"/>
+            <a:ext cx="1453142" cy="304095"/>
+          </a:xfrm>
+          <a:prstGeom prst="rect">
+            <a:avLst/>
+          </a:prstGeom>
+          <a:noFill/>
+          <a:ln>
+            <a:solidFill>
+              <a:schemeClr val="tx1"/>
+            </a:solidFill>
+          </a:ln>
+        </p:spPr>
+        <p:txBody>
+          <a:bodyPr wrap="square" lIns="57315" tIns="28657" rIns="57315" bIns="28657" rtlCol="0">
+            <a:spAutoFit/>
+          </a:bodyPr>
+          <a:lstStyle/>
+          <a:p>
+            <a:r>
+              <a:rPr lang="en-US" sz="800" dirty="0"/>
+              <a:t>CD56HIGH NK cells</a:t>
+            </a:r>
+          </a:p>
           <a:p>
             <a:r>
               <a:rPr lang="en-US" sz="800" dirty="0" smtClean="0"/>
-              <a:t>Removed </a:t>
-            </a:r>
-            <a:r>
-              <a:rPr lang="en-US" sz="800" smtClean="0"/>
-              <a:t>manual gates of 0,1,2,3</a:t>
+              <a:t>(CD16</a:t>
+            </a:r>
+            <a:r>
+              <a:rPr lang="en-US" sz="800" dirty="0"/>
+              <a:t>+ CD56</a:t>
+            </a:r>
+            <a:r>
+              <a:rPr lang="en-US" sz="800" dirty="0" smtClean="0"/>
+              <a:t>+++)</a:t>
             </a:r>
             <a:endParaRPr lang="en-US" sz="800" dirty="0"/>
+          </a:p>
+        </p:txBody>
+      </p:sp>
+      <p:sp>
+        <p:nvSpPr>
+          <p:cNvPr id="30" name="TextBox 29"/>
+          <p:cNvSpPr txBox="1"/>
+          <p:nvPr/>
+        </p:nvSpPr>
+        <p:spPr>
+          <a:xfrm>
+            <a:off x="8069414" y="5762698"/>
+            <a:ext cx="998386" cy="304095"/>
+          </a:xfrm>
+          <a:prstGeom prst="rect">
+            <a:avLst/>
+          </a:prstGeom>
+          <a:noFill/>
+          <a:ln>
+            <a:solidFill>
+              <a:schemeClr val="tx1"/>
+            </a:solidFill>
+          </a:ln>
+        </p:spPr>
+        <p:txBody>
+          <a:bodyPr wrap="square" lIns="57315" tIns="28657" rIns="57315" bIns="28657" rtlCol="0">
+            <a:spAutoFit/>
+          </a:bodyPr>
+          <a:lstStyle/>
+          <a:p>
+            <a:r>
+              <a:rPr lang="en-US" sz="800" dirty="0"/>
+              <a:t>CD56LOW NK cells</a:t>
+            </a:r>
+          </a:p>
+          <a:p>
+            <a:r>
+              <a:rPr lang="en-US" sz="800" dirty="0" smtClean="0"/>
+              <a:t>(CD16</a:t>
+            </a:r>
+            <a:r>
+              <a:rPr lang="en-US" sz="800" dirty="0"/>
+              <a:t>+ CD56</a:t>
+            </a:r>
+            <a:r>
+              <a:rPr lang="en-US" sz="800" dirty="0" smtClean="0"/>
+              <a:t>+)</a:t>
+            </a:r>
+            <a:endParaRPr lang="en-US" sz="800" dirty="0"/>
+          </a:p>
+        </p:txBody>
+      </p:sp>
+      <p:sp>
+        <p:nvSpPr>
+          <p:cNvPr id="34" name="TextBox 33"/>
+          <p:cNvSpPr txBox="1"/>
+          <p:nvPr/>
+        </p:nvSpPr>
+        <p:spPr>
+          <a:xfrm>
+            <a:off x="0" y="2"/>
+            <a:ext cx="1051819" cy="288698"/>
+          </a:xfrm>
+          <a:prstGeom prst="rect">
+            <a:avLst/>
+          </a:prstGeom>
+          <a:noFill/>
+        </p:spPr>
+        <p:txBody>
+          <a:bodyPr wrap="none" lIns="57305" tIns="28653" rIns="57305" bIns="28653" rtlCol="0">
+            <a:spAutoFit/>
+          </a:bodyPr>
+          <a:lstStyle/>
+          <a:p>
+            <a:r>
+              <a:rPr lang="en-US" sz="1500" b="1" dirty="0"/>
+              <a:t>PANEL </a:t>
+            </a:r>
+            <a:r>
+              <a:rPr lang="en-US" sz="1500" b="1" dirty="0" smtClean="0"/>
+              <a:t>2_v2</a:t>
+            </a:r>
+            <a:endParaRPr lang="en-US" sz="1500" b="1" dirty="0"/>
           </a:p>
         </p:txBody>
       </p:sp>
     </p:spTree>
     <p:extLst>
       <p:ext uri="{BB962C8B-B14F-4D97-AF65-F5344CB8AC3E}">
-        <p14:creationId xmlns:p14="http://schemas.microsoft.com/office/powerpoint/2010/main" val="2393645102"/>
+        <p14:creationId xmlns:p14="http://schemas.microsoft.com/office/powerpoint/2010/main" val="240423813"/>
       </p:ext>
     </p:extLst>
   </p:cSld>
@@ -6868,4 +8404,265 @@
   <a:objectDefaults/>
   <a:extraClrSchemeLst/>
 </a:theme>
+</file>
+
+<file path=ppt/theme/theme2.xml><?xml version="1.0" encoding="utf-8"?>
+<a:theme xmlns:a="http://schemas.openxmlformats.org/drawingml/2006/main" name="Office Theme">
+  <a:themeElements>
+    <a:clrScheme name="Office">
+      <a:dk1>
+        <a:sysClr val="windowText" lastClr="000000"/>
+      </a:dk1>
+      <a:lt1>
+        <a:sysClr val="window" lastClr="FFFFFF"/>
+      </a:lt1>
+      <a:dk2>
+        <a:srgbClr val="44546A"/>
+      </a:dk2>
+      <a:lt2>
+        <a:srgbClr val="E7E6E6"/>
+      </a:lt2>
+      <a:accent1>
+        <a:srgbClr val="4472C4"/>
+      </a:accent1>
+      <a:accent2>
+        <a:srgbClr val="ED7D31"/>
+      </a:accent2>
+      <a:accent3>
+        <a:srgbClr val="A5A5A5"/>
+      </a:accent3>
+      <a:accent4>
+        <a:srgbClr val="FFC000"/>
+      </a:accent4>
+      <a:accent5>
+        <a:srgbClr val="5B9BD5"/>
+      </a:accent5>
+      <a:accent6>
+        <a:srgbClr val="70AD47"/>
+      </a:accent6>
+      <a:hlink>
+        <a:srgbClr val="0563C1"/>
+      </a:hlink>
+      <a:folHlink>
+        <a:srgbClr val="954F72"/>
+      </a:folHlink>
+    </a:clrScheme>
+    <a:fontScheme name="Office">
+      <a:majorFont>
+        <a:latin typeface="Calibri Light" panose="020F0302020204030204"/>
+        <a:ea typeface=""/>
+        <a:cs typeface=""/>
+        <a:font script="Jpan" typeface="Yu Gothic Light"/>
+        <a:font script="Hang" typeface="맑은 고딕"/>
+        <a:font script="Hans" typeface="DengXian Light"/>
+        <a:font script="Hant" typeface="新細明體"/>
+        <a:font script="Arab" typeface="Times New Roman"/>
+        <a:font script="Hebr" typeface="Times New Roman"/>
+        <a:font script="Thai" typeface="Angsana New"/>
+        <a:font script="Ethi" typeface="Nyala"/>
+        <a:font script="Beng" typeface="Vrinda"/>
+        <a:font script="Gujr" typeface="Shruti"/>
+        <a:font script="Khmr" typeface="MoolBoran"/>
+        <a:font script="Knda" typeface="Tunga"/>
+        <a:font script="Guru" typeface="Raavi"/>
+        <a:font script="Cans" typeface="Euphemia"/>
+        <a:font script="Cher" typeface="Plantagenet Cherokee"/>
+        <a:font script="Yiii" typeface="Microsoft Yi Baiti"/>
+        <a:font script="Tibt" typeface="Microsoft Himalaya"/>
+        <a:font script="Thaa" typeface="MV Boli"/>
+        <a:font script="Deva" typeface="Mangal"/>
+        <a:font script="Telu" typeface="Gautami"/>
+        <a:font script="Taml" typeface="Latha"/>
+        <a:font script="Syrc" typeface="Estrangelo Edessa"/>
+        <a:font script="Orya" typeface="Kalinga"/>
+        <a:font script="Mlym" typeface="Kartika"/>
+        <a:font script="Laoo" typeface="DokChampa"/>
+        <a:font script="Sinh" typeface="Iskoola Pota"/>
+        <a:font script="Mong" typeface="Mongolian Baiti"/>
+        <a:font script="Viet" typeface="Times New Roman"/>
+        <a:font script="Uigh" typeface="Microsoft Uighur"/>
+        <a:font script="Geor" typeface="Sylfaen"/>
+      </a:majorFont>
+      <a:minorFont>
+        <a:latin typeface="Calibri" panose="020F0502020204030204"/>
+        <a:ea typeface=""/>
+        <a:cs typeface=""/>
+        <a:font script="Jpan" typeface="Yu Gothic"/>
+        <a:font script="Hang" typeface="맑은 고딕"/>
+        <a:font script="Hans" typeface="DengXian"/>
+        <a:font script="Hant" typeface="新細明體"/>
+        <a:font script="Arab" typeface="Arial"/>
+        <a:font script="Hebr" typeface="Arial"/>
+        <a:font script="Thai" typeface="Cordia New"/>
+        <a:font script="Ethi" typeface="Nyala"/>
+        <a:font script="Beng" typeface="Vrinda"/>
+        <a:font script="Gujr" typeface="Shruti"/>
+        <a:font script="Khmr" typeface="DaunPenh"/>
+        <a:font script="Knda" typeface="Tunga"/>
+        <a:font script="Guru" typeface="Raavi"/>
+        <a:font script="Cans" typeface="Euphemia"/>
+        <a:font script="Cher" typeface="Plantagenet Cherokee"/>
+        <a:font script="Yiii" typeface="Microsoft Yi Baiti"/>
+        <a:font script="Tibt" typeface="Microsoft Himalaya"/>
+        <a:font script="Thaa" typeface="MV Boli"/>
+        <a:font script="Deva" typeface="Mangal"/>
+        <a:font script="Telu" typeface="Gautami"/>
+        <a:font script="Taml" typeface="Latha"/>
+        <a:font script="Syrc" typeface="Estrangelo Edessa"/>
+        <a:font script="Orya" typeface="Kalinga"/>
+        <a:font script="Mlym" typeface="Kartika"/>
+        <a:font script="Laoo" typeface="DokChampa"/>
+        <a:font script="Sinh" typeface="Iskoola Pota"/>
+        <a:font script="Mong" typeface="Mongolian Baiti"/>
+        <a:font script="Viet" typeface="Arial"/>
+        <a:font script="Uigh" typeface="Microsoft Uighur"/>
+        <a:font script="Geor" typeface="Sylfaen"/>
+      </a:minorFont>
+    </a:fontScheme>
+    <a:fmtScheme name="Office">
+      <a:fillStyleLst>
+        <a:solidFill>
+          <a:schemeClr val="phClr"/>
+        </a:solidFill>
+        <a:gradFill rotWithShape="1">
+          <a:gsLst>
+            <a:gs pos="0">
+              <a:schemeClr val="phClr">
+                <a:lumMod val="110000"/>
+                <a:satMod val="105000"/>
+                <a:tint val="67000"/>
+              </a:schemeClr>
+            </a:gs>
+            <a:gs pos="50000">
+              <a:schemeClr val="phClr">
+                <a:lumMod val="105000"/>
+                <a:satMod val="103000"/>
+                <a:tint val="73000"/>
+              </a:schemeClr>
+            </a:gs>
+            <a:gs pos="100000">
+              <a:schemeClr val="phClr">
+                <a:lumMod val="105000"/>
+                <a:satMod val="109000"/>
+                <a:tint val="81000"/>
+              </a:schemeClr>
+            </a:gs>
+          </a:gsLst>
+          <a:lin ang="5400000" scaled="0"/>
+        </a:gradFill>
+        <a:gradFill rotWithShape="1">
+          <a:gsLst>
+            <a:gs pos="0">
+              <a:schemeClr val="phClr">
+                <a:satMod val="103000"/>
+                <a:lumMod val="102000"/>
+                <a:tint val="94000"/>
+              </a:schemeClr>
+            </a:gs>
+            <a:gs pos="50000">
+              <a:schemeClr val="phClr">
+                <a:satMod val="110000"/>
+                <a:lumMod val="100000"/>
+                <a:shade val="100000"/>
+              </a:schemeClr>
+            </a:gs>
+            <a:gs pos="100000">
+              <a:schemeClr val="phClr">
+                <a:lumMod val="99000"/>
+                <a:satMod val="120000"/>
+                <a:shade val="78000"/>
+              </a:schemeClr>
+            </a:gs>
+          </a:gsLst>
+          <a:lin ang="5400000" scaled="0"/>
+        </a:gradFill>
+      </a:fillStyleLst>
+      <a:lnStyleLst>
+        <a:ln w="6350" cap="flat" cmpd="sng" algn="ctr">
+          <a:solidFill>
+            <a:schemeClr val="phClr"/>
+          </a:solidFill>
+          <a:prstDash val="solid"/>
+          <a:miter lim="800000"/>
+        </a:ln>
+        <a:ln w="12700" cap="flat" cmpd="sng" algn="ctr">
+          <a:solidFill>
+            <a:schemeClr val="phClr"/>
+          </a:solidFill>
+          <a:prstDash val="solid"/>
+          <a:miter lim="800000"/>
+        </a:ln>
+        <a:ln w="19050" cap="flat" cmpd="sng" algn="ctr">
+          <a:solidFill>
+            <a:schemeClr val="phClr"/>
+          </a:solidFill>
+          <a:prstDash val="solid"/>
+          <a:miter lim="800000"/>
+        </a:ln>
+      </a:lnStyleLst>
+      <a:effectStyleLst>
+        <a:effectStyle>
+          <a:effectLst/>
+        </a:effectStyle>
+        <a:effectStyle>
+          <a:effectLst/>
+        </a:effectStyle>
+        <a:effectStyle>
+          <a:effectLst>
+            <a:outerShdw blurRad="57150" dist="19050" dir="5400000" algn="ctr" rotWithShape="0">
+              <a:srgbClr val="000000">
+                <a:alpha val="63000"/>
+              </a:srgbClr>
+            </a:outerShdw>
+          </a:effectLst>
+        </a:effectStyle>
+      </a:effectStyleLst>
+      <a:bgFillStyleLst>
+        <a:solidFill>
+          <a:schemeClr val="phClr"/>
+        </a:solidFill>
+        <a:solidFill>
+          <a:schemeClr val="phClr">
+            <a:tint val="95000"/>
+            <a:satMod val="170000"/>
+          </a:schemeClr>
+        </a:solidFill>
+        <a:gradFill rotWithShape="1">
+          <a:gsLst>
+            <a:gs pos="0">
+              <a:schemeClr val="phClr">
+                <a:tint val="93000"/>
+                <a:satMod val="150000"/>
+                <a:shade val="98000"/>
+                <a:lumMod val="102000"/>
+              </a:schemeClr>
+            </a:gs>
+            <a:gs pos="50000">
+              <a:schemeClr val="phClr">
+                <a:tint val="98000"/>
+                <a:satMod val="130000"/>
+                <a:shade val="90000"/>
+                <a:lumMod val="103000"/>
+              </a:schemeClr>
+            </a:gs>
+            <a:gs pos="100000">
+              <a:schemeClr val="phClr">
+                <a:shade val="63000"/>
+                <a:satMod val="120000"/>
+              </a:schemeClr>
+            </a:gs>
+          </a:gsLst>
+          <a:lin ang="5400000" scaled="0"/>
+        </a:gradFill>
+      </a:bgFillStyleLst>
+    </a:fmtScheme>
+  </a:themeElements>
+  <a:objectDefaults/>
+  <a:extraClrSchemeLst/>
+  <a:extLst>
+    <a:ext uri="{05A4C25C-085E-4340-85A3-A5531E510DB2}">
+      <thm15:themeFamily xmlns:thm15="http://schemas.microsoft.com/office/thememl/2012/main" name="Office Theme" id="{62F939B6-93AF-4DB8-9C6B-D6C7DFDC589F}" vid="{4A3C46E8-61CC-4603-A589-7422A47A8E4A}"/>
+    </a:ext>
+  </a:extLst>
+</a:theme>
 </file>
</xml_diff>